<commit_message>
Update presentation slides with the merging interval time and corresponsing bandwidth
</commit_message>
<xml_diff>
--- a/related_works/summary_slides/Project_Progress_20180713.pptx
+++ b/related_works/summary_slides/Project_Progress_20180713.pptx
@@ -11539,10 +11539,10 @@
       </p:sp>
       <p:pic>
         <p:nvPicPr>
-          <p:cNvPr id="9" name="Picture 8">
+          <p:cNvPr id="7" name="Picture 6">
             <a:extLst>
               <a:ext uri="{FF2B5EF4-FFF2-40B4-BE49-F238E27FC236}">
-                <a16:creationId xmlns:a16="http://schemas.microsoft.com/office/drawing/2014/main" id="{D04F310B-C039-6348-9F18-3C4095C6EA04}"/>
+                <a16:creationId xmlns:a16="http://schemas.microsoft.com/office/drawing/2014/main" id="{443D3C58-7D07-3D42-AD6D-CAA512C5E98B}"/>
               </a:ext>
             </a:extLst>
           </p:cNvPr>
@@ -11559,8 +11559,8 @@
         </p:blipFill>
         <p:spPr>
           <a:xfrm>
-            <a:off x="1948436" y="829994"/>
-            <a:ext cx="5262147" cy="3946610"/>
+            <a:off x="1957104" y="842996"/>
+            <a:ext cx="5244811" cy="3933608"/>
           </a:xfrm>
           <a:prstGeom prst="rect">
             <a:avLst/>
@@ -11665,10 +11665,10 @@
       </p:sp>
       <p:pic>
         <p:nvPicPr>
-          <p:cNvPr id="11" name="Picture 10">
+          <p:cNvPr id="7" name="Picture 6">
             <a:extLst>
               <a:ext uri="{FF2B5EF4-FFF2-40B4-BE49-F238E27FC236}">
-                <a16:creationId xmlns:a16="http://schemas.microsoft.com/office/drawing/2014/main" id="{4F9186D8-AE88-CD4B-B4E4-FEADEAD8E251}"/>
+                <a16:creationId xmlns:a16="http://schemas.microsoft.com/office/drawing/2014/main" id="{66416BBE-987B-384B-B1B2-7624D5440D50}"/>
               </a:ext>
             </a:extLst>
           </p:cNvPr>
@@ -11685,8 +11685,8 @@
         </p:blipFill>
         <p:spPr>
           <a:xfrm>
-            <a:off x="1963564" y="838620"/>
-            <a:ext cx="5231891" cy="3923918"/>
+            <a:off x="1939291" y="816276"/>
+            <a:ext cx="5280437" cy="3960328"/>
           </a:xfrm>
           <a:prstGeom prst="rect">
             <a:avLst/>
@@ -11791,10 +11791,10 @@
       </p:sp>
       <p:pic>
         <p:nvPicPr>
-          <p:cNvPr id="7" name="Picture 6">
+          <p:cNvPr id="8" name="Picture 7">
             <a:extLst>
               <a:ext uri="{FF2B5EF4-FFF2-40B4-BE49-F238E27FC236}">
-                <a16:creationId xmlns:a16="http://schemas.microsoft.com/office/drawing/2014/main" id="{CD648772-3ECF-D74A-83A4-2C6A3567CD89}"/>
+                <a16:creationId xmlns:a16="http://schemas.microsoft.com/office/drawing/2014/main" id="{4C30B2AE-0436-1644-B2B6-73A6F0D5D7E8}"/>
               </a:ext>
             </a:extLst>
           </p:cNvPr>
@@ -11811,8 +11811,8 @@
         </p:blipFill>
         <p:spPr>
           <a:xfrm>
-            <a:off x="1967244" y="858205"/>
-            <a:ext cx="5224532" cy="3918399"/>
+            <a:off x="1941372" y="819398"/>
+            <a:ext cx="5276275" cy="3957206"/>
           </a:xfrm>
           <a:prstGeom prst="rect">
             <a:avLst/>
@@ -11917,10 +11917,10 @@
       </p:sp>
       <p:pic>
         <p:nvPicPr>
-          <p:cNvPr id="7" name="Picture 6">
+          <p:cNvPr id="8" name="Picture 7">
             <a:extLst>
               <a:ext uri="{FF2B5EF4-FFF2-40B4-BE49-F238E27FC236}">
-                <a16:creationId xmlns:a16="http://schemas.microsoft.com/office/drawing/2014/main" id="{9D696821-F037-8448-A2CB-1E0AACFF2E7D}"/>
+                <a16:creationId xmlns:a16="http://schemas.microsoft.com/office/drawing/2014/main" id="{07FA8F1D-ADF6-EB48-A35F-DC71D27F1146}"/>
               </a:ext>
             </a:extLst>
           </p:cNvPr>
@@ -11937,8 +11937,8 @@
         </p:blipFill>
         <p:spPr>
           <a:xfrm>
-            <a:off x="1967192" y="858128"/>
-            <a:ext cx="5224635" cy="3918476"/>
+            <a:off x="1939291" y="816276"/>
+            <a:ext cx="5280437" cy="3960328"/>
           </a:xfrm>
           <a:prstGeom prst="rect">
             <a:avLst/>
@@ -12043,10 +12043,10 @@
       </p:sp>
       <p:pic>
         <p:nvPicPr>
-          <p:cNvPr id="9" name="Picture 8">
+          <p:cNvPr id="7" name="Picture 6">
             <a:extLst>
               <a:ext uri="{FF2B5EF4-FFF2-40B4-BE49-F238E27FC236}">
-                <a16:creationId xmlns:a16="http://schemas.microsoft.com/office/drawing/2014/main" id="{154CE2CD-C93C-FF4F-A558-ED3D13E57CC9}"/>
+                <a16:creationId xmlns:a16="http://schemas.microsoft.com/office/drawing/2014/main" id="{7DD5BF77-86EE-ED44-B684-06EAA09436B1}"/>
               </a:ext>
             </a:extLst>
           </p:cNvPr>
@@ -12063,8 +12063,8 @@
         </p:blipFill>
         <p:spPr>
           <a:xfrm>
-            <a:off x="1964229" y="853683"/>
-            <a:ext cx="5230561" cy="3922921"/>
+            <a:off x="1945229" y="825182"/>
+            <a:ext cx="5268562" cy="3951422"/>
           </a:xfrm>
           <a:prstGeom prst="rect">
             <a:avLst/>
@@ -12374,10 +12374,10 @@
       </p:sp>
       <p:pic>
         <p:nvPicPr>
-          <p:cNvPr id="8" name="Picture 7">
+          <p:cNvPr id="7" name="Picture 6">
             <a:extLst>
               <a:ext uri="{FF2B5EF4-FFF2-40B4-BE49-F238E27FC236}">
-                <a16:creationId xmlns:a16="http://schemas.microsoft.com/office/drawing/2014/main" id="{818838D8-5B81-394F-BE06-AFF22760BD64}"/>
+                <a16:creationId xmlns:a16="http://schemas.microsoft.com/office/drawing/2014/main" id="{F3199512-2D3E-A64B-A8AB-EA502028C7BE}"/>
               </a:ext>
             </a:extLst>
           </p:cNvPr>
@@ -12394,8 +12394,8 @@
         </p:blipFill>
         <p:spPr>
           <a:xfrm>
-            <a:off x="1944635" y="824292"/>
-            <a:ext cx="5269749" cy="3952312"/>
+            <a:off x="1949291" y="831276"/>
+            <a:ext cx="5260437" cy="3945328"/>
           </a:xfrm>
           <a:prstGeom prst="rect">
             <a:avLst/>
@@ -12500,10 +12500,10 @@
       </p:sp>
       <p:pic>
         <p:nvPicPr>
-          <p:cNvPr id="9" name="Picture 8">
+          <p:cNvPr id="8" name="Picture 7">
             <a:extLst>
               <a:ext uri="{FF2B5EF4-FFF2-40B4-BE49-F238E27FC236}">
-                <a16:creationId xmlns:a16="http://schemas.microsoft.com/office/drawing/2014/main" id="{04EEF1C7-26E1-874D-816F-665557C69D22}"/>
+                <a16:creationId xmlns:a16="http://schemas.microsoft.com/office/drawing/2014/main" id="{3DA15CF4-D52F-0241-B713-2FF8A496744F}"/>
               </a:ext>
             </a:extLst>
           </p:cNvPr>
@@ -12520,8 +12520,8 @@
         </p:blipFill>
         <p:spPr>
           <a:xfrm>
-            <a:off x="1952455" y="836022"/>
-            <a:ext cx="5254110" cy="3940582"/>
+            <a:off x="1949289" y="831273"/>
+            <a:ext cx="5260441" cy="3945331"/>
           </a:xfrm>
           <a:prstGeom prst="rect">
             <a:avLst/>

</xml_diff>

<commit_message>
Correct slides on the number of validation files in the climate data benchmark
</commit_message>
<xml_diff>
--- a/related_works/summary_slides/Project_Progress_20180713.pptx
+++ b/related_works/summary_slides/Project_Progress_20180713.pptx
@@ -9713,7 +9713,7 @@
               <a:rPr lang="en-US" sz="1700" dirty="0">
                 <a:cs typeface="Avenir Book"/>
               </a:rPr>
-              <a:t>Validation Files: last 90% = 56464</a:t>
+              <a:t>Validation Files: last 10% = 6273</a:t>
             </a:r>
           </a:p>
           <a:p>
@@ -9755,7 +9755,19 @@
               <a:rPr lang="en-US" sz="1700" b="0" dirty="0">
                 <a:cs typeface="Avenir Book"/>
               </a:rPr>
-              <a:t>If number of nodes is 64, each node reads 784 training files and 882 validation files</a:t>
+              <a:t>If number of nodes is 64, each node reads 784 training files and </a:t>
+            </a:r>
+            <a:r>
+              <a:rPr lang="en-US" sz="1700" dirty="0">
+                <a:cs typeface="Avenir Book"/>
+              </a:rPr>
+              <a:t>98</a:t>
+            </a:r>
+            <a:r>
+              <a:rPr lang="en-US" sz="1700" b="0" dirty="0">
+                <a:cs typeface="Avenir Book"/>
+              </a:rPr>
+              <a:t> validation files</a:t>
             </a:r>
           </a:p>
         </p:txBody>

</xml_diff>